<commit_message>
version for the submission
Signed-off-by: Anton Kutlin <anton.kutlin@gmail.com>
</commit_message>
<xml_diff>
--- a/mpi/articles/Symmetry relations and functional equations for Stokes constants/corrected/stuff/draft.pptx
+++ b/mpi/articles/Symmetry relations and functional equations for Stokes constants/corrected/stuff/draft.pptx
@@ -248,7 +248,7 @@
           <a:p>
             <a:fld id="{16F1CFC5-FEF9-4E1E-B162-222FAA77EDF6}" type="datetimeFigureOut">
               <a:rPr lang="ru-RU" smtClean="0"/>
-              <a:t>17.09.2017</a:t>
+              <a:t>22.09.2017</a:t>
             </a:fld>
             <a:endParaRPr lang="ru-RU"/>
           </a:p>
@@ -418,7 +418,7 @@
           <a:p>
             <a:fld id="{16F1CFC5-FEF9-4E1E-B162-222FAA77EDF6}" type="datetimeFigureOut">
               <a:rPr lang="ru-RU" smtClean="0"/>
-              <a:t>17.09.2017</a:t>
+              <a:t>22.09.2017</a:t>
             </a:fld>
             <a:endParaRPr lang="ru-RU"/>
           </a:p>
@@ -598,7 +598,7 @@
           <a:p>
             <a:fld id="{16F1CFC5-FEF9-4E1E-B162-222FAA77EDF6}" type="datetimeFigureOut">
               <a:rPr lang="ru-RU" smtClean="0"/>
-              <a:t>17.09.2017</a:t>
+              <a:t>22.09.2017</a:t>
             </a:fld>
             <a:endParaRPr lang="ru-RU"/>
           </a:p>
@@ -768,7 +768,7 @@
           <a:p>
             <a:fld id="{16F1CFC5-FEF9-4E1E-B162-222FAA77EDF6}" type="datetimeFigureOut">
               <a:rPr lang="ru-RU" smtClean="0"/>
-              <a:t>17.09.2017</a:t>
+              <a:t>22.09.2017</a:t>
             </a:fld>
             <a:endParaRPr lang="ru-RU"/>
           </a:p>
@@ -1012,7 +1012,7 @@
           <a:p>
             <a:fld id="{16F1CFC5-FEF9-4E1E-B162-222FAA77EDF6}" type="datetimeFigureOut">
               <a:rPr lang="ru-RU" smtClean="0"/>
-              <a:t>17.09.2017</a:t>
+              <a:t>22.09.2017</a:t>
             </a:fld>
             <a:endParaRPr lang="ru-RU"/>
           </a:p>
@@ -1244,7 +1244,7 @@
           <a:p>
             <a:fld id="{16F1CFC5-FEF9-4E1E-B162-222FAA77EDF6}" type="datetimeFigureOut">
               <a:rPr lang="ru-RU" smtClean="0"/>
-              <a:t>17.09.2017</a:t>
+              <a:t>22.09.2017</a:t>
             </a:fld>
             <a:endParaRPr lang="ru-RU"/>
           </a:p>
@@ -1611,7 +1611,7 @@
           <a:p>
             <a:fld id="{16F1CFC5-FEF9-4E1E-B162-222FAA77EDF6}" type="datetimeFigureOut">
               <a:rPr lang="ru-RU" smtClean="0"/>
-              <a:t>17.09.2017</a:t>
+              <a:t>22.09.2017</a:t>
             </a:fld>
             <a:endParaRPr lang="ru-RU"/>
           </a:p>
@@ -1729,7 +1729,7 @@
           <a:p>
             <a:fld id="{16F1CFC5-FEF9-4E1E-B162-222FAA77EDF6}" type="datetimeFigureOut">
               <a:rPr lang="ru-RU" smtClean="0"/>
-              <a:t>17.09.2017</a:t>
+              <a:t>22.09.2017</a:t>
             </a:fld>
             <a:endParaRPr lang="ru-RU"/>
           </a:p>
@@ -1824,7 +1824,7 @@
           <a:p>
             <a:fld id="{16F1CFC5-FEF9-4E1E-B162-222FAA77EDF6}" type="datetimeFigureOut">
               <a:rPr lang="ru-RU" smtClean="0"/>
-              <a:t>17.09.2017</a:t>
+              <a:t>22.09.2017</a:t>
             </a:fld>
             <a:endParaRPr lang="ru-RU"/>
           </a:p>
@@ -2101,7 +2101,7 @@
           <a:p>
             <a:fld id="{16F1CFC5-FEF9-4E1E-B162-222FAA77EDF6}" type="datetimeFigureOut">
               <a:rPr lang="ru-RU" smtClean="0"/>
-              <a:t>17.09.2017</a:t>
+              <a:t>22.09.2017</a:t>
             </a:fld>
             <a:endParaRPr lang="ru-RU"/>
           </a:p>
@@ -2358,7 +2358,7 @@
           <a:p>
             <a:fld id="{16F1CFC5-FEF9-4E1E-B162-222FAA77EDF6}" type="datetimeFigureOut">
               <a:rPr lang="ru-RU" smtClean="0"/>
-              <a:t>17.09.2017</a:t>
+              <a:t>22.09.2017</a:t>
             </a:fld>
             <a:endParaRPr lang="ru-RU"/>
           </a:p>
@@ -2571,7 +2571,7 @@
           <a:p>
             <a:fld id="{16F1CFC5-FEF9-4E1E-B162-222FAA77EDF6}" type="datetimeFigureOut">
               <a:rPr lang="ru-RU" smtClean="0"/>
-              <a:t>17.09.2017</a:t>
+              <a:t>22.09.2017</a:t>
             </a:fld>
             <a:endParaRPr lang="ru-RU"/>
           </a:p>
@@ -14525,7 +14525,7 @@
         </p:nvSpPr>
         <p:spPr>
           <a:xfrm rot="5400000">
-            <a:off x="4975068" y="3059956"/>
+            <a:off x="4904255" y="3059956"/>
             <a:ext cx="3161367" cy="3161367"/>
           </a:xfrm>
           <a:prstGeom prst="arc">
@@ -14580,7 +14580,7 @@
         </p:nvSpPr>
         <p:spPr>
           <a:xfrm rot="5400000">
-            <a:off x="9212914" y="3059956"/>
+            <a:off x="9130857" y="3059956"/>
             <a:ext cx="3161367" cy="3161367"/>
           </a:xfrm>
           <a:prstGeom prst="arc">
@@ -15151,8 +15151,8 @@
           </p:sp>
         </mc:Fallback>
       </mc:AlternateContent>
-      <mc:AlternateContent xmlns:mc="http://schemas.openxmlformats.org/markup-compatibility/2006" xmlns:a14="http://schemas.microsoft.com/office/drawing/2010/main">
-        <mc:Choice Requires="a14">
+      <mc:AlternateContent xmlns:mc="http://schemas.openxmlformats.org/markup-compatibility/2006">
+        <mc:Choice xmlns:a14="http://schemas.microsoft.com/office/drawing/2010/main" Requires="a14">
           <p:sp>
             <p:nvSpPr>
               <p:cNvPr id="198" name="TextBox 197"/>
@@ -15162,7 +15162,7 @@
             <p:spPr>
               <a:xfrm>
                 <a:off x="4406953" y="2652535"/>
-                <a:ext cx="301365" cy="369332"/>
+                <a:ext cx="370614" cy="369332"/>
               </a:xfrm>
               <a:prstGeom prst="rect">
                 <a:avLst/>
@@ -15183,10 +15183,16 @@
                     </m:oMathParaPr>
                     <m:oMath xmlns:m="http://schemas.openxmlformats.org/officeDocument/2006/math">
                       <m:r>
-                        <a:rPr lang="en-US" sz="2400" i="1">
+                        <a:rPr lang="en-US" sz="2400" b="0" i="1" smtClean="0">
                           <a:latin typeface="Cambria Math" panose="02040503050406030204" pitchFamily="18" charset="0"/>
                         </a:rPr>
-                        <m:t>2.</m:t>
+                        <m:t>𝑏</m:t>
+                      </m:r>
+                      <m:r>
+                        <a:rPr lang="en-US" sz="2400" b="0" i="1" smtClean="0">
+                          <a:latin typeface="Cambria Math" panose="02040503050406030204" pitchFamily="18" charset="0"/>
+                        </a:rPr>
+                        <m:t>)</m:t>
                       </m:r>
                     </m:oMath>
                   </m:oMathPara>
@@ -15196,7 +15202,7 @@
             </p:txBody>
           </p:sp>
         </mc:Choice>
-        <mc:Fallback xmlns="">
+        <mc:Fallback>
           <p:sp>
             <p:nvSpPr>
               <p:cNvPr id="198" name="TextBox 197"/>
@@ -15208,7 +15214,7 @@
             <p:spPr>
               <a:xfrm>
                 <a:off x="4406953" y="2652535"/>
-                <a:ext cx="301365" cy="369332"/>
+                <a:ext cx="370614" cy="369332"/>
               </a:xfrm>
               <a:prstGeom prst="rect">
                 <a:avLst/>
@@ -15216,7 +15222,7 @@
               <a:blipFill>
                 <a:blip r:embed="rId6"/>
                 <a:stretch>
-                  <a:fillRect l="-24490" r="-4082" b="-6557"/>
+                  <a:fillRect l="-19672" r="-27869" b="-34426"/>
                 </a:stretch>
               </a:blipFill>
             </p:spPr>
@@ -15235,8 +15241,8 @@
           </p:sp>
         </mc:Fallback>
       </mc:AlternateContent>
-      <mc:AlternateContent xmlns:mc="http://schemas.openxmlformats.org/markup-compatibility/2006" xmlns:a14="http://schemas.microsoft.com/office/drawing/2010/main">
-        <mc:Choice Requires="a14">
+      <mc:AlternateContent xmlns:mc="http://schemas.openxmlformats.org/markup-compatibility/2006">
+        <mc:Choice xmlns:a14="http://schemas.microsoft.com/office/drawing/2010/main" Requires="a14">
           <p:sp>
             <p:nvSpPr>
               <p:cNvPr id="199" name="TextBox 198"/>
@@ -15246,7 +15252,7 @@
             <p:spPr>
               <a:xfrm>
                 <a:off x="8614417" y="2661699"/>
-                <a:ext cx="301365" cy="369332"/>
+                <a:ext cx="347980" cy="369332"/>
               </a:xfrm>
               <a:prstGeom prst="rect">
                 <a:avLst/>
@@ -15267,10 +15273,16 @@
                     </m:oMathParaPr>
                     <m:oMath xmlns:m="http://schemas.openxmlformats.org/officeDocument/2006/math">
                       <m:r>
-                        <a:rPr lang="en-US" sz="2400" i="1">
+                        <a:rPr lang="en-US" sz="2400" b="0" i="1" smtClean="0">
                           <a:latin typeface="Cambria Math" panose="02040503050406030204" pitchFamily="18" charset="0"/>
                         </a:rPr>
-                        <m:t>3.</m:t>
+                        <m:t>𝑐</m:t>
+                      </m:r>
+                      <m:r>
+                        <a:rPr lang="en-US" sz="2400" b="0" i="1" smtClean="0">
+                          <a:latin typeface="Cambria Math" panose="02040503050406030204" pitchFamily="18" charset="0"/>
+                        </a:rPr>
+                        <m:t>)</m:t>
                       </m:r>
                     </m:oMath>
                   </m:oMathPara>
@@ -15280,7 +15292,7 @@
             </p:txBody>
           </p:sp>
         </mc:Choice>
-        <mc:Fallback xmlns="">
+        <mc:Fallback>
           <p:sp>
             <p:nvSpPr>
               <p:cNvPr id="199" name="TextBox 198"/>
@@ -15292,7 +15304,7 @@
             <p:spPr>
               <a:xfrm>
                 <a:off x="8614417" y="2661699"/>
-                <a:ext cx="301365" cy="369332"/>
+                <a:ext cx="347980" cy="369332"/>
               </a:xfrm>
               <a:prstGeom prst="rect">
                 <a:avLst/>
@@ -15300,7 +15312,7 @@
               <a:blipFill>
                 <a:blip r:embed="rId7"/>
                 <a:stretch>
-                  <a:fillRect l="-22000" r="-4000" b="-6667"/>
+                  <a:fillRect l="-10526" r="-31579" b="-35000"/>
                 </a:stretch>
               </a:blipFill>
             </p:spPr>
@@ -15319,8 +15331,8 @@
           </p:sp>
         </mc:Fallback>
       </mc:AlternateContent>
-      <mc:AlternateContent xmlns:mc="http://schemas.openxmlformats.org/markup-compatibility/2006" xmlns:a14="http://schemas.microsoft.com/office/drawing/2010/main">
-        <mc:Choice Requires="a14">
+      <mc:AlternateContent xmlns:mc="http://schemas.openxmlformats.org/markup-compatibility/2006">
+        <mc:Choice xmlns:a14="http://schemas.microsoft.com/office/drawing/2010/main" Requires="a14">
           <p:sp>
             <p:nvSpPr>
               <p:cNvPr id="200" name="TextBox 199"/>
@@ -15330,7 +15342,7 @@
             <p:spPr>
               <a:xfrm>
                 <a:off x="157065" y="2651700"/>
-                <a:ext cx="301365" cy="369332"/>
+                <a:ext cx="376193" cy="369332"/>
               </a:xfrm>
               <a:prstGeom prst="rect">
                 <a:avLst/>
@@ -15351,10 +15363,16 @@
                     </m:oMathParaPr>
                     <m:oMath xmlns:m="http://schemas.openxmlformats.org/officeDocument/2006/math">
                       <m:r>
-                        <a:rPr lang="en-US" sz="2400" i="1">
+                        <a:rPr lang="en-US" sz="2400" b="0" i="1" smtClean="0">
                           <a:latin typeface="Cambria Math" panose="02040503050406030204" pitchFamily="18" charset="0"/>
                         </a:rPr>
-                        <m:t>1.</m:t>
+                        <m:t>𝑎</m:t>
+                      </m:r>
+                      <m:r>
+                        <a:rPr lang="en-US" sz="2400" b="0" i="1" smtClean="0">
+                          <a:latin typeface="Cambria Math" panose="02040503050406030204" pitchFamily="18" charset="0"/>
+                        </a:rPr>
+                        <m:t>)</m:t>
                       </m:r>
                     </m:oMath>
                   </m:oMathPara>
@@ -15364,7 +15382,7 @@
             </p:txBody>
           </p:sp>
         </mc:Choice>
-        <mc:Fallback xmlns="">
+        <mc:Fallback>
           <p:sp>
             <p:nvSpPr>
               <p:cNvPr id="200" name="TextBox 199"/>
@@ -15376,7 +15394,7 @@
             <p:spPr>
               <a:xfrm>
                 <a:off x="157065" y="2651700"/>
-                <a:ext cx="301365" cy="369332"/>
+                <a:ext cx="376193" cy="369332"/>
               </a:xfrm>
               <a:prstGeom prst="rect">
                 <a:avLst/>
@@ -15384,7 +15402,7 @@
               <a:blipFill>
                 <a:blip r:embed="rId8"/>
                 <a:stretch>
-                  <a:fillRect l="-24490" r="-4082" b="-4918"/>
+                  <a:fillRect l="-11475" r="-29508" b="-32787"/>
                 </a:stretch>
               </a:blipFill>
             </p:spPr>
@@ -15545,6 +15563,176 @@
           </a:fontRef>
         </p:style>
       </p:cxnSp>
+      <mc:AlternateContent xmlns:mc="http://schemas.openxmlformats.org/markup-compatibility/2006">
+        <mc:Choice xmlns:a14="http://schemas.microsoft.com/office/drawing/2010/main" Requires="a14">
+          <p:sp>
+            <p:nvSpPr>
+              <p:cNvPr id="86" name="TextBox 85"/>
+              <p:cNvSpPr txBox="1"/>
+              <p:nvPr/>
+            </p:nvSpPr>
+            <p:spPr>
+              <a:xfrm>
+                <a:off x="7582212" y="3079885"/>
+                <a:ext cx="343571" cy="369332"/>
+              </a:xfrm>
+              <a:prstGeom prst="rect">
+                <a:avLst/>
+              </a:prstGeom>
+              <a:noFill/>
+            </p:spPr>
+            <p:txBody>
+              <a:bodyPr wrap="square" lIns="0" tIns="0" rIns="0" bIns="0" rtlCol="0">
+                <a:spAutoFit/>
+              </a:bodyPr>
+              <a:lstStyle/>
+              <a:p>
+                <a:pPr/>
+                <a14:m>
+                  <m:oMathPara xmlns:m="http://schemas.openxmlformats.org/officeDocument/2006/math">
+                    <m:oMathParaPr>
+                      <m:jc m:val="centerGroup"/>
+                    </m:oMathParaPr>
+                    <m:oMath xmlns:m="http://schemas.openxmlformats.org/officeDocument/2006/math">
+                      <m:r>
+                        <a:rPr lang="ru-RU" sz="2400" i="1" smtClean="0">
+                          <a:latin typeface="Cambria Math" panose="02040503050406030204" pitchFamily="18" charset="0"/>
+                          <a:ea typeface="Cambria Math" panose="02040503050406030204" pitchFamily="18" charset="0"/>
+                        </a:rPr>
+                        <m:t>𝛾</m:t>
+                      </m:r>
+                    </m:oMath>
+                  </m:oMathPara>
+                </a14:m>
+                <a:endParaRPr lang="ru-RU" sz="2400" dirty="0"/>
+              </a:p>
+            </p:txBody>
+          </p:sp>
+        </mc:Choice>
+        <mc:Fallback>
+          <p:sp>
+            <p:nvSpPr>
+              <p:cNvPr id="86" name="TextBox 85"/>
+              <p:cNvSpPr txBox="1">
+                <a:spLocks noRot="1" noChangeAspect="1" noMove="1" noResize="1" noEditPoints="1" noAdjustHandles="1" noChangeArrowheads="1" noChangeShapeType="1" noTextEdit="1"/>
+              </p:cNvSpPr>
+              <p:nvPr/>
+            </p:nvSpPr>
+            <p:spPr>
+              <a:xfrm>
+                <a:off x="7582212" y="3079885"/>
+                <a:ext cx="343571" cy="369332"/>
+              </a:xfrm>
+              <a:prstGeom prst="rect">
+                <a:avLst/>
+              </a:prstGeom>
+              <a:blipFill>
+                <a:blip r:embed="rId9"/>
+                <a:stretch>
+                  <a:fillRect l="-7143" r="-1786" b="-22951"/>
+                </a:stretch>
+              </a:blipFill>
+            </p:spPr>
+            <p:txBody>
+              <a:bodyPr/>
+              <a:lstStyle/>
+              <a:p>
+                <a:r>
+                  <a:rPr lang="ru-RU">
+                    <a:noFill/>
+                  </a:rPr>
+                  <a:t> </a:t>
+                </a:r>
+              </a:p>
+            </p:txBody>
+          </p:sp>
+        </mc:Fallback>
+      </mc:AlternateContent>
+      <mc:AlternateContent xmlns:mc="http://schemas.openxmlformats.org/markup-compatibility/2006">
+        <mc:Choice xmlns:a14="http://schemas.microsoft.com/office/drawing/2010/main" Requires="a14">
+          <p:sp>
+            <p:nvSpPr>
+              <p:cNvPr id="88" name="TextBox 87"/>
+              <p:cNvSpPr txBox="1"/>
+              <p:nvPr/>
+            </p:nvSpPr>
+            <p:spPr>
+              <a:xfrm>
+                <a:off x="11816717" y="3093091"/>
+                <a:ext cx="343571" cy="369332"/>
+              </a:xfrm>
+              <a:prstGeom prst="rect">
+                <a:avLst/>
+              </a:prstGeom>
+              <a:noFill/>
+            </p:spPr>
+            <p:txBody>
+              <a:bodyPr wrap="square" lIns="0" tIns="0" rIns="0" bIns="0" rtlCol="0">
+                <a:spAutoFit/>
+              </a:bodyPr>
+              <a:lstStyle/>
+              <a:p>
+                <a:pPr/>
+                <a14:m>
+                  <m:oMathPara xmlns:m="http://schemas.openxmlformats.org/officeDocument/2006/math">
+                    <m:oMathParaPr>
+                      <m:jc m:val="centerGroup"/>
+                    </m:oMathParaPr>
+                    <m:oMath xmlns:m="http://schemas.openxmlformats.org/officeDocument/2006/math">
+                      <m:r>
+                        <a:rPr lang="ru-RU" sz="2400" i="1" smtClean="0">
+                          <a:latin typeface="Cambria Math" panose="02040503050406030204" pitchFamily="18" charset="0"/>
+                          <a:ea typeface="Cambria Math" panose="02040503050406030204" pitchFamily="18" charset="0"/>
+                        </a:rPr>
+                        <m:t>𝛾</m:t>
+                      </m:r>
+                    </m:oMath>
+                  </m:oMathPara>
+                </a14:m>
+                <a:endParaRPr lang="ru-RU" sz="2400" dirty="0"/>
+              </a:p>
+            </p:txBody>
+          </p:sp>
+        </mc:Choice>
+        <mc:Fallback>
+          <p:sp>
+            <p:nvSpPr>
+              <p:cNvPr id="88" name="TextBox 87"/>
+              <p:cNvSpPr txBox="1">
+                <a:spLocks noRot="1" noChangeAspect="1" noMove="1" noResize="1" noEditPoints="1" noAdjustHandles="1" noChangeArrowheads="1" noChangeShapeType="1" noTextEdit="1"/>
+              </p:cNvSpPr>
+              <p:nvPr/>
+            </p:nvSpPr>
+            <p:spPr>
+              <a:xfrm>
+                <a:off x="11816717" y="3093091"/>
+                <a:ext cx="343571" cy="369332"/>
+              </a:xfrm>
+              <a:prstGeom prst="rect">
+                <a:avLst/>
+              </a:prstGeom>
+              <a:blipFill>
+                <a:blip r:embed="rId10"/>
+                <a:stretch>
+                  <a:fillRect l="-5263" r="-1754" b="-22951"/>
+                </a:stretch>
+              </a:blipFill>
+            </p:spPr>
+            <p:txBody>
+              <a:bodyPr/>
+              <a:lstStyle/>
+              <a:p>
+                <a:r>
+                  <a:rPr lang="ru-RU">
+                    <a:noFill/>
+                  </a:rPr>
+                  <a:t> </a:t>
+                </a:r>
+              </a:p>
+            </p:txBody>
+          </p:sp>
+        </mc:Fallback>
+      </mc:AlternateContent>
     </p:spTree>
     <p:extLst>
       <p:ext uri="{BB962C8B-B14F-4D97-AF65-F5344CB8AC3E}">
@@ -17186,8 +17374,8 @@
           </a:p>
         </p:txBody>
       </p:sp>
-      <mc:AlternateContent xmlns:mc="http://schemas.openxmlformats.org/markup-compatibility/2006" xmlns:a14="http://schemas.microsoft.com/office/drawing/2010/main">
-        <mc:Choice Requires="a14">
+      <mc:AlternateContent xmlns:mc="http://schemas.openxmlformats.org/markup-compatibility/2006">
+        <mc:Choice xmlns:a14="http://schemas.microsoft.com/office/drawing/2010/main" Requires="a14">
           <p:sp>
             <p:nvSpPr>
               <p:cNvPr id="327" name="TextBox 326"/>
@@ -17197,7 +17385,7 @@
             <p:spPr>
               <a:xfrm>
                 <a:off x="4406953" y="2652535"/>
-                <a:ext cx="301365" cy="369332"/>
+                <a:ext cx="370614" cy="369332"/>
               </a:xfrm>
               <a:prstGeom prst="rect">
                 <a:avLst/>
@@ -17218,10 +17406,16 @@
                     </m:oMathParaPr>
                     <m:oMath xmlns:m="http://schemas.openxmlformats.org/officeDocument/2006/math">
                       <m:r>
-                        <a:rPr lang="en-US" sz="2400" i="1">
+                        <a:rPr lang="en-US" sz="2400" b="0" i="1" smtClean="0">
                           <a:latin typeface="Cambria Math" panose="02040503050406030204" pitchFamily="18" charset="0"/>
                         </a:rPr>
-                        <m:t>2.</m:t>
+                        <m:t>𝑏</m:t>
+                      </m:r>
+                      <m:r>
+                        <a:rPr lang="en-US" sz="2400" b="0" i="1" smtClean="0">
+                          <a:latin typeface="Cambria Math" panose="02040503050406030204" pitchFamily="18" charset="0"/>
+                        </a:rPr>
+                        <m:t>)</m:t>
                       </m:r>
                     </m:oMath>
                   </m:oMathPara>
@@ -17231,7 +17425,7 @@
             </p:txBody>
           </p:sp>
         </mc:Choice>
-        <mc:Fallback xmlns="">
+        <mc:Fallback>
           <p:sp>
             <p:nvSpPr>
               <p:cNvPr id="327" name="TextBox 326"/>
@@ -17243,7 +17437,7 @@
             <p:spPr>
               <a:xfrm>
                 <a:off x="4406953" y="2652535"/>
-                <a:ext cx="301365" cy="369332"/>
+                <a:ext cx="370614" cy="369332"/>
               </a:xfrm>
               <a:prstGeom prst="rect">
                 <a:avLst/>
@@ -17251,7 +17445,7 @@
               <a:blipFill>
                 <a:blip r:embed="rId2"/>
                 <a:stretch>
-                  <a:fillRect l="-24490" r="-4082" b="-6557"/>
+                  <a:fillRect l="-19672" r="-27869" b="-34426"/>
                 </a:stretch>
               </a:blipFill>
             </p:spPr>
@@ -17270,8 +17464,8 @@
           </p:sp>
         </mc:Fallback>
       </mc:AlternateContent>
-      <mc:AlternateContent xmlns:mc="http://schemas.openxmlformats.org/markup-compatibility/2006" xmlns:a14="http://schemas.microsoft.com/office/drawing/2010/main">
-        <mc:Choice Requires="a14">
+      <mc:AlternateContent xmlns:mc="http://schemas.openxmlformats.org/markup-compatibility/2006">
+        <mc:Choice xmlns:a14="http://schemas.microsoft.com/office/drawing/2010/main" Requires="a14">
           <p:sp>
             <p:nvSpPr>
               <p:cNvPr id="328" name="TextBox 327"/>
@@ -17281,7 +17475,7 @@
             <p:spPr>
               <a:xfrm>
                 <a:off x="8614417" y="2661699"/>
-                <a:ext cx="301365" cy="369332"/>
+                <a:ext cx="347980" cy="369332"/>
               </a:xfrm>
               <a:prstGeom prst="rect">
                 <a:avLst/>
@@ -17302,10 +17496,16 @@
                     </m:oMathParaPr>
                     <m:oMath xmlns:m="http://schemas.openxmlformats.org/officeDocument/2006/math">
                       <m:r>
-                        <a:rPr lang="en-US" sz="2400" i="1">
+                        <a:rPr lang="en-US" sz="2400" b="0" i="1" smtClean="0">
                           <a:latin typeface="Cambria Math" panose="02040503050406030204" pitchFamily="18" charset="0"/>
                         </a:rPr>
-                        <m:t>3.</m:t>
+                        <m:t>𝑐</m:t>
+                      </m:r>
+                      <m:r>
+                        <a:rPr lang="en-US" sz="2400" b="0" i="1" smtClean="0">
+                          <a:latin typeface="Cambria Math" panose="02040503050406030204" pitchFamily="18" charset="0"/>
+                        </a:rPr>
+                        <m:t>)</m:t>
                       </m:r>
                     </m:oMath>
                   </m:oMathPara>
@@ -17315,7 +17515,7 @@
             </p:txBody>
           </p:sp>
         </mc:Choice>
-        <mc:Fallback xmlns="">
+        <mc:Fallback>
           <p:sp>
             <p:nvSpPr>
               <p:cNvPr id="328" name="TextBox 327"/>
@@ -17327,7 +17527,7 @@
             <p:spPr>
               <a:xfrm>
                 <a:off x="8614417" y="2661699"/>
-                <a:ext cx="301365" cy="369332"/>
+                <a:ext cx="347980" cy="369332"/>
               </a:xfrm>
               <a:prstGeom prst="rect">
                 <a:avLst/>
@@ -17335,7 +17535,7 @@
               <a:blipFill>
                 <a:blip r:embed="rId3"/>
                 <a:stretch>
-                  <a:fillRect l="-22000" r="-4000" b="-6667"/>
+                  <a:fillRect l="-10526" r="-31579" b="-35000"/>
                 </a:stretch>
               </a:blipFill>
             </p:spPr>
@@ -22807,8 +23007,8 @@
           </a:p>
         </p:txBody>
       </p:sp>
-      <mc:AlternateContent xmlns:mc="http://schemas.openxmlformats.org/markup-compatibility/2006" xmlns:a14="http://schemas.microsoft.com/office/drawing/2010/main">
-        <mc:Choice Requires="a14">
+      <mc:AlternateContent xmlns:mc="http://schemas.openxmlformats.org/markup-compatibility/2006">
+        <mc:Choice xmlns:a14="http://schemas.microsoft.com/office/drawing/2010/main" Requires="a14">
           <p:sp>
             <p:nvSpPr>
               <p:cNvPr id="383" name="TextBox 382"/>
@@ -22818,7 +23018,7 @@
             <p:spPr>
               <a:xfrm>
                 <a:off x="203639" y="2647130"/>
-                <a:ext cx="301365" cy="369332"/>
+                <a:ext cx="376193" cy="369332"/>
               </a:xfrm>
               <a:prstGeom prst="rect">
                 <a:avLst/>
@@ -22839,10 +23039,16 @@
                     </m:oMathParaPr>
                     <m:oMath xmlns:m="http://schemas.openxmlformats.org/officeDocument/2006/math">
                       <m:r>
-                        <a:rPr lang="en-US" sz="2400" i="1">
+                        <a:rPr lang="en-US" sz="2400" b="0" i="1" smtClean="0">
                           <a:latin typeface="Cambria Math" panose="02040503050406030204" pitchFamily="18" charset="0"/>
                         </a:rPr>
-                        <m:t>1.</m:t>
+                        <m:t>𝑎</m:t>
+                      </m:r>
+                      <m:r>
+                        <a:rPr lang="en-US" sz="2400" b="0" i="1" smtClean="0">
+                          <a:latin typeface="Cambria Math" panose="02040503050406030204" pitchFamily="18" charset="0"/>
+                        </a:rPr>
+                        <m:t>)</m:t>
                       </m:r>
                     </m:oMath>
                   </m:oMathPara>
@@ -22852,7 +23058,7 @@
             </p:txBody>
           </p:sp>
         </mc:Choice>
-        <mc:Fallback xmlns="">
+        <mc:Fallback>
           <p:sp>
             <p:nvSpPr>
               <p:cNvPr id="383" name="TextBox 382"/>
@@ -22864,7 +23070,7 @@
             <p:spPr>
               <a:xfrm>
                 <a:off x="203639" y="2647130"/>
-                <a:ext cx="301365" cy="369332"/>
+                <a:ext cx="376193" cy="369332"/>
               </a:xfrm>
               <a:prstGeom prst="rect">
                 <a:avLst/>
@@ -22872,7 +23078,7 @@
               <a:blipFill>
                 <a:blip r:embed="rId4"/>
                 <a:stretch>
-                  <a:fillRect l="-22000" r="-4000" b="-6557"/>
+                  <a:fillRect l="-9677" r="-29032" b="-34426"/>
                 </a:stretch>
               </a:blipFill>
             </p:spPr>
@@ -23494,8 +23700,8 @@
           </p:sp>
         </mc:Fallback>
       </mc:AlternateContent>
-      <mc:AlternateContent xmlns:mc="http://schemas.openxmlformats.org/markup-compatibility/2006" xmlns:a14="http://schemas.microsoft.com/office/drawing/2010/main">
-        <mc:Choice Requires="a14">
+      <mc:AlternateContent xmlns:mc="http://schemas.openxmlformats.org/markup-compatibility/2006">
+        <mc:Choice xmlns:a14="http://schemas.microsoft.com/office/drawing/2010/main" Requires="a14">
           <p:sp>
             <p:nvSpPr>
               <p:cNvPr id="404" name="TextBox 403"/>
@@ -23504,7 +23710,7 @@
             </p:nvSpPr>
             <p:spPr>
               <a:xfrm>
-                <a:off x="5013087" y="2698469"/>
+                <a:off x="5070590" y="2791587"/>
                 <a:ext cx="219547" cy="372281"/>
               </a:xfrm>
               <a:prstGeom prst="rect">
@@ -23539,7 +23745,7 @@
             </p:txBody>
           </p:sp>
         </mc:Choice>
-        <mc:Fallback xmlns="">
+        <mc:Fallback>
           <p:sp>
             <p:nvSpPr>
               <p:cNvPr id="404" name="TextBox 403"/>
@@ -23550,7 +23756,7 @@
             </p:nvSpPr>
             <p:spPr>
               <a:xfrm>
-                <a:off x="5013087" y="2698469"/>
+                <a:off x="5070590" y="2791587"/>
                 <a:ext cx="219547" cy="372281"/>
               </a:xfrm>
               <a:prstGeom prst="rect">
@@ -23559,7 +23765,7 @@
               <a:blipFill>
                 <a:blip r:embed="rId9"/>
                 <a:stretch>
-                  <a:fillRect l="-16667" r="-16667"/>
+                  <a:fillRect l="-19444" r="-13889"/>
                 </a:stretch>
               </a:blipFill>
             </p:spPr>
@@ -23663,6 +23869,218 @@
                 <a:blip r:embed="rId10"/>
                 <a:stretch>
                   <a:fillRect l="-12500" r="-7143" b="-13115"/>
+                </a:stretch>
+              </a:blipFill>
+            </p:spPr>
+            <p:txBody>
+              <a:bodyPr/>
+              <a:lstStyle/>
+              <a:p>
+                <a:r>
+                  <a:rPr lang="ru-RU">
+                    <a:noFill/>
+                  </a:rPr>
+                  <a:t> </a:t>
+                </a:r>
+              </a:p>
+            </p:txBody>
+          </p:sp>
+        </mc:Fallback>
+      </mc:AlternateContent>
+      <mc:AlternateContent xmlns:mc="http://schemas.openxmlformats.org/markup-compatibility/2006">
+        <mc:Choice xmlns:a14="http://schemas.microsoft.com/office/drawing/2010/main" Requires="a14">
+          <p:sp>
+            <p:nvSpPr>
+              <p:cNvPr id="67" name="TextBox 66"/>
+              <p:cNvSpPr txBox="1"/>
+              <p:nvPr/>
+            </p:nvSpPr>
+            <p:spPr>
+              <a:xfrm>
+                <a:off x="5782543" y="3018997"/>
+                <a:ext cx="343571" cy="369332"/>
+              </a:xfrm>
+              <a:prstGeom prst="rect">
+                <a:avLst/>
+              </a:prstGeom>
+              <a:noFill/>
+            </p:spPr>
+            <p:txBody>
+              <a:bodyPr wrap="square" lIns="0" tIns="0" rIns="0" bIns="0" rtlCol="0">
+                <a:spAutoFit/>
+              </a:bodyPr>
+              <a:lstStyle/>
+              <a:p>
+                <a:pPr/>
+                <a14:m>
+                  <m:oMathPara xmlns:m="http://schemas.openxmlformats.org/officeDocument/2006/math">
+                    <m:oMathParaPr>
+                      <m:jc m:val="centerGroup"/>
+                    </m:oMathParaPr>
+                    <m:oMath xmlns:m="http://schemas.openxmlformats.org/officeDocument/2006/math">
+                      <m:sSub>
+                        <m:sSubPr>
+                          <m:ctrlPr>
+                            <a:rPr lang="ru-RU" sz="2400" i="1" smtClean="0">
+                              <a:latin typeface="Cambria Math" panose="02040503050406030204" pitchFamily="18" charset="0"/>
+                              <a:ea typeface="Cambria Math" panose="02040503050406030204" pitchFamily="18" charset="0"/>
+                            </a:rPr>
+                          </m:ctrlPr>
+                        </m:sSubPr>
+                        <m:e>
+                          <m:r>
+                            <a:rPr lang="ru-RU" sz="2400" i="1" smtClean="0">
+                              <a:latin typeface="Cambria Math" panose="02040503050406030204" pitchFamily="18" charset="0"/>
+                              <a:ea typeface="Cambria Math" panose="02040503050406030204" pitchFamily="18" charset="0"/>
+                            </a:rPr>
+                            <m:t>𝛾</m:t>
+                          </m:r>
+                        </m:e>
+                        <m:sub>
+                          <m:r>
+                            <a:rPr lang="ru-RU" sz="2400" b="0" i="1" smtClean="0">
+                              <a:latin typeface="Cambria Math" panose="02040503050406030204" pitchFamily="18" charset="0"/>
+                              <a:ea typeface="Cambria Math" panose="02040503050406030204" pitchFamily="18" charset="0"/>
+                            </a:rPr>
+                            <m:t>1</m:t>
+                          </m:r>
+                        </m:sub>
+                      </m:sSub>
+                    </m:oMath>
+                  </m:oMathPara>
+                </a14:m>
+                <a:endParaRPr lang="ru-RU" sz="2400" dirty="0"/>
+              </a:p>
+            </p:txBody>
+          </p:sp>
+        </mc:Choice>
+        <mc:Fallback>
+          <p:sp>
+            <p:nvSpPr>
+              <p:cNvPr id="67" name="TextBox 66"/>
+              <p:cNvSpPr txBox="1">
+                <a:spLocks noRot="1" noChangeAspect="1" noMove="1" noResize="1" noEditPoints="1" noAdjustHandles="1" noChangeArrowheads="1" noChangeShapeType="1" noTextEdit="1"/>
+              </p:cNvSpPr>
+              <p:nvPr/>
+            </p:nvSpPr>
+            <p:spPr>
+              <a:xfrm>
+                <a:off x="5782543" y="3018997"/>
+                <a:ext cx="343571" cy="369332"/>
+              </a:xfrm>
+              <a:prstGeom prst="rect">
+                <a:avLst/>
+              </a:prstGeom>
+              <a:blipFill>
+                <a:blip r:embed="rId11"/>
+                <a:stretch>
+                  <a:fillRect l="-23214" r="-8929" b="-22951"/>
+                </a:stretch>
+              </a:blipFill>
+            </p:spPr>
+            <p:txBody>
+              <a:bodyPr/>
+              <a:lstStyle/>
+              <a:p>
+                <a:r>
+                  <a:rPr lang="ru-RU">
+                    <a:noFill/>
+                  </a:rPr>
+                  <a:t> </a:t>
+                </a:r>
+              </a:p>
+            </p:txBody>
+          </p:sp>
+        </mc:Fallback>
+      </mc:AlternateContent>
+      <mc:AlternateContent xmlns:mc="http://schemas.openxmlformats.org/markup-compatibility/2006">
+        <mc:Choice xmlns:a14="http://schemas.microsoft.com/office/drawing/2010/main" Requires="a14">
+          <p:sp>
+            <p:nvSpPr>
+              <p:cNvPr id="68" name="TextBox 67"/>
+              <p:cNvSpPr txBox="1"/>
+              <p:nvPr/>
+            </p:nvSpPr>
+            <p:spPr>
+              <a:xfrm>
+                <a:off x="10739192" y="3579601"/>
+                <a:ext cx="343571" cy="369332"/>
+              </a:xfrm>
+              <a:prstGeom prst="rect">
+                <a:avLst/>
+              </a:prstGeom>
+              <a:noFill/>
+            </p:spPr>
+            <p:txBody>
+              <a:bodyPr wrap="square" lIns="0" tIns="0" rIns="0" bIns="0" rtlCol="0">
+                <a:spAutoFit/>
+              </a:bodyPr>
+              <a:lstStyle/>
+              <a:p>
+                <a:pPr/>
+                <a14:m>
+                  <m:oMathPara xmlns:m="http://schemas.openxmlformats.org/officeDocument/2006/math">
+                    <m:oMathParaPr>
+                      <m:jc m:val="centerGroup"/>
+                    </m:oMathParaPr>
+                    <m:oMath xmlns:m="http://schemas.openxmlformats.org/officeDocument/2006/math">
+                      <m:sSub>
+                        <m:sSubPr>
+                          <m:ctrlPr>
+                            <a:rPr lang="ru-RU" sz="2400" i="1" smtClean="0">
+                              <a:latin typeface="Cambria Math" panose="02040503050406030204" pitchFamily="18" charset="0"/>
+                              <a:ea typeface="Cambria Math" panose="02040503050406030204" pitchFamily="18" charset="0"/>
+                            </a:rPr>
+                          </m:ctrlPr>
+                        </m:sSubPr>
+                        <m:e>
+                          <m:r>
+                            <a:rPr lang="ru-RU" sz="2400" i="1" smtClean="0">
+                              <a:latin typeface="Cambria Math" panose="02040503050406030204" pitchFamily="18" charset="0"/>
+                              <a:ea typeface="Cambria Math" panose="02040503050406030204" pitchFamily="18" charset="0"/>
+                            </a:rPr>
+                            <m:t>𝛾</m:t>
+                          </m:r>
+                        </m:e>
+                        <m:sub>
+                          <m:r>
+                            <a:rPr lang="ru-RU" sz="2400" b="0" i="1" smtClean="0">
+                              <a:latin typeface="Cambria Math" panose="02040503050406030204" pitchFamily="18" charset="0"/>
+                              <a:ea typeface="Cambria Math" panose="02040503050406030204" pitchFamily="18" charset="0"/>
+                            </a:rPr>
+                            <m:t>2</m:t>
+                          </m:r>
+                        </m:sub>
+                      </m:sSub>
+                    </m:oMath>
+                  </m:oMathPara>
+                </a14:m>
+                <a:endParaRPr lang="ru-RU" sz="2400" dirty="0"/>
+              </a:p>
+            </p:txBody>
+          </p:sp>
+        </mc:Choice>
+        <mc:Fallback>
+          <p:sp>
+            <p:nvSpPr>
+              <p:cNvPr id="68" name="TextBox 67"/>
+              <p:cNvSpPr txBox="1">
+                <a:spLocks noRot="1" noChangeAspect="1" noMove="1" noResize="1" noEditPoints="1" noAdjustHandles="1" noChangeArrowheads="1" noChangeShapeType="1" noTextEdit="1"/>
+              </p:cNvSpPr>
+              <p:nvPr/>
+            </p:nvSpPr>
+            <p:spPr>
+              <a:xfrm>
+                <a:off x="10739192" y="3579601"/>
+                <a:ext cx="343571" cy="369332"/>
+              </a:xfrm>
+              <a:prstGeom prst="rect">
+                <a:avLst/>
+              </a:prstGeom>
+              <a:blipFill>
+                <a:blip r:embed="rId12"/>
+                <a:stretch>
+                  <a:fillRect l="-25000" r="-8929" b="-22951"/>
                 </a:stretch>
               </a:blipFill>
             </p:spPr>
@@ -27739,8 +28157,8 @@
           </a:p>
         </p:txBody>
       </p:sp>
-      <mc:AlternateContent xmlns:mc="http://schemas.openxmlformats.org/markup-compatibility/2006" xmlns:a14="http://schemas.microsoft.com/office/drawing/2010/main">
-        <mc:Choice Requires="a14">
+      <mc:AlternateContent xmlns:mc="http://schemas.openxmlformats.org/markup-compatibility/2006">
+        <mc:Choice xmlns:a14="http://schemas.microsoft.com/office/drawing/2010/main" Requires="a14">
           <p:sp>
             <p:nvSpPr>
               <p:cNvPr id="160" name="TextBox 159"/>
@@ -27751,7 +28169,7 @@
             </p:nvSpPr>
             <p:spPr>
               <a:xfrm>
-                <a:off x="334511" y="2662111"/>
+                <a:off x="305483" y="2662111"/>
                 <a:ext cx="255366" cy="369332"/>
               </a:xfrm>
               <a:prstGeom prst="rect">
@@ -27773,11 +28191,18 @@
                     </m:oMathParaPr>
                     <m:oMath xmlns:m="http://schemas.openxmlformats.org/officeDocument/2006/math">
                       <m:r>
-                        <a:rPr lang="en-US" sz="2400" i="1">
+                        <a:rPr lang="en-US" sz="2400" b="0" i="1" smtClean="0">
                           <a:latin typeface="Cambria Math" panose="02040503050406030204" pitchFamily="18" charset="0"/>
                           <a:ea typeface="Cambria Math" panose="02040503050406030204" pitchFamily="18" charset="0"/>
                         </a:rPr>
-                        <m:t>1.</m:t>
+                        <m:t>𝑎</m:t>
+                      </m:r>
+                      <m:r>
+                        <a:rPr lang="en-US" sz="2400" b="0" i="1" smtClean="0">
+                          <a:latin typeface="Cambria Math" panose="02040503050406030204" pitchFamily="18" charset="0"/>
+                          <a:ea typeface="Cambria Math" panose="02040503050406030204" pitchFamily="18" charset="0"/>
+                        </a:rPr>
+                        <m:t>)</m:t>
                       </m:r>
                     </m:oMath>
                   </m:oMathPara>
@@ -27790,7 +28215,7 @@
             </p:txBody>
           </p:sp>
         </mc:Choice>
-        <mc:Fallback xmlns="">
+        <mc:Fallback>
           <p:sp>
             <p:nvSpPr>
               <p:cNvPr id="160" name="TextBox 159"/>
@@ -27801,7 +28226,7 @@
             </p:nvSpPr>
             <p:spPr>
               <a:xfrm>
-                <a:off x="334511" y="2662111"/>
+                <a:off x="305483" y="2662111"/>
                 <a:ext cx="255366" cy="369332"/>
               </a:xfrm>
               <a:prstGeom prst="rect">
@@ -27810,7 +28235,7 @@
               <a:blipFill>
                 <a:blip r:embed="rId20"/>
                 <a:stretch>
-                  <a:fillRect l="-38095" r="-11905" b="-10000"/>
+                  <a:fillRect l="-28571" r="-76190" b="-38333"/>
                 </a:stretch>
               </a:blipFill>
             </p:spPr>
@@ -27829,8 +28254,8 @@
           </p:sp>
         </mc:Fallback>
       </mc:AlternateContent>
-      <mc:AlternateContent xmlns:mc="http://schemas.openxmlformats.org/markup-compatibility/2006" xmlns:a14="http://schemas.microsoft.com/office/drawing/2010/main">
-        <mc:Choice Requires="a14">
+      <mc:AlternateContent xmlns:mc="http://schemas.openxmlformats.org/markup-compatibility/2006">
+        <mc:Choice xmlns:a14="http://schemas.microsoft.com/office/drawing/2010/main" Requires="a14">
           <p:sp>
             <p:nvSpPr>
               <p:cNvPr id="161" name="TextBox 160"/>
@@ -27863,11 +28288,18 @@
                     </m:oMathParaPr>
                     <m:oMath xmlns:m="http://schemas.openxmlformats.org/officeDocument/2006/math">
                       <m:r>
-                        <a:rPr lang="en-US" sz="2400" i="1">
+                        <a:rPr lang="en-US" sz="2400" b="0" i="1" smtClean="0">
                           <a:latin typeface="Cambria Math" panose="02040503050406030204" pitchFamily="18" charset="0"/>
                           <a:ea typeface="Cambria Math" panose="02040503050406030204" pitchFamily="18" charset="0"/>
                         </a:rPr>
-                        <m:t>2.</m:t>
+                        <m:t>𝑏</m:t>
+                      </m:r>
+                      <m:r>
+                        <a:rPr lang="en-US" sz="2400" b="0" i="1" smtClean="0">
+                          <a:latin typeface="Cambria Math" panose="02040503050406030204" pitchFamily="18" charset="0"/>
+                          <a:ea typeface="Cambria Math" panose="02040503050406030204" pitchFamily="18" charset="0"/>
+                        </a:rPr>
+                        <m:t>)</m:t>
                       </m:r>
                     </m:oMath>
                   </m:oMathPara>
@@ -27880,7 +28312,7 @@
             </p:txBody>
           </p:sp>
         </mc:Choice>
-        <mc:Fallback xmlns="">
+        <mc:Fallback>
           <p:sp>
             <p:nvSpPr>
               <p:cNvPr id="161" name="TextBox 160"/>
@@ -27900,7 +28332,7 @@
               <a:blipFill>
                 <a:blip r:embed="rId21"/>
                 <a:stretch>
-                  <a:fillRect l="-39024" r="-14634" b="-9836"/>
+                  <a:fillRect l="-43902" r="-75610" b="-37705"/>
                 </a:stretch>
               </a:blipFill>
             </p:spPr>
@@ -27919,8 +28351,8 @@
           </p:sp>
         </mc:Fallback>
       </mc:AlternateContent>
-      <mc:AlternateContent xmlns:mc="http://schemas.openxmlformats.org/markup-compatibility/2006" xmlns:a14="http://schemas.microsoft.com/office/drawing/2010/main">
-        <mc:Choice Requires="a14">
+      <mc:AlternateContent xmlns:mc="http://schemas.openxmlformats.org/markup-compatibility/2006">
+        <mc:Choice xmlns:a14="http://schemas.microsoft.com/office/drawing/2010/main" Requires="a14">
           <p:sp>
             <p:nvSpPr>
               <p:cNvPr id="162" name="TextBox 161"/>
@@ -27930,7 +28362,7 @@
             <p:spPr>
               <a:xfrm>
                 <a:off x="8875472" y="2662111"/>
-                <a:ext cx="299762" cy="369332"/>
+                <a:ext cx="346377" cy="369332"/>
               </a:xfrm>
               <a:prstGeom prst="rect">
                 <a:avLst/>
@@ -27951,11 +28383,18 @@
                     </m:oMathParaPr>
                     <m:oMath xmlns:m="http://schemas.openxmlformats.org/officeDocument/2006/math">
                       <m:r>
-                        <a:rPr lang="en-US" sz="2400" i="1">
+                        <a:rPr lang="en-US" sz="2400" b="0" i="1" smtClean="0">
                           <a:latin typeface="Cambria Math" panose="02040503050406030204" pitchFamily="18" charset="0"/>
                           <a:ea typeface="Cambria Math" panose="02040503050406030204" pitchFamily="18" charset="0"/>
                         </a:rPr>
-                        <m:t>3.</m:t>
+                        <m:t>𝑐</m:t>
+                      </m:r>
+                      <m:r>
+                        <a:rPr lang="en-US" sz="2400" b="0" i="1" smtClean="0">
+                          <a:latin typeface="Cambria Math" panose="02040503050406030204" pitchFamily="18" charset="0"/>
+                          <a:ea typeface="Cambria Math" panose="02040503050406030204" pitchFamily="18" charset="0"/>
+                        </a:rPr>
+                        <m:t>)</m:t>
                       </m:r>
                     </m:oMath>
                   </m:oMathPara>
@@ -27968,7 +28407,7 @@
             </p:txBody>
           </p:sp>
         </mc:Choice>
-        <mc:Fallback xmlns="">
+        <mc:Fallback>
           <p:sp>
             <p:nvSpPr>
               <p:cNvPr id="162" name="TextBox 161"/>
@@ -27980,7 +28419,7 @@
             <p:spPr>
               <a:xfrm>
                 <a:off x="8875472" y="2662111"/>
-                <a:ext cx="299762" cy="369332"/>
+                <a:ext cx="346377" cy="369332"/>
               </a:xfrm>
               <a:prstGeom prst="rect">
                 <a:avLst/>
@@ -27988,7 +28427,7 @@
               <a:blipFill>
                 <a:blip r:embed="rId22"/>
                 <a:stretch>
-                  <a:fillRect l="-24490" r="-4082" b="-10000"/>
+                  <a:fillRect l="-12281" r="-29825" b="-38333"/>
                 </a:stretch>
               </a:blipFill>
             </p:spPr>
@@ -31941,8 +32380,8 @@
           </p:sp>
         </mc:Fallback>
       </mc:AlternateContent>
-      <mc:AlternateContent xmlns:mc="http://schemas.openxmlformats.org/markup-compatibility/2006" xmlns:a14="http://schemas.microsoft.com/office/drawing/2010/main">
-        <mc:Choice Requires="a14">
+      <mc:AlternateContent xmlns:mc="http://schemas.openxmlformats.org/markup-compatibility/2006">
+        <mc:Choice xmlns:a14="http://schemas.microsoft.com/office/drawing/2010/main" Requires="a14">
           <p:sp>
             <p:nvSpPr>
               <p:cNvPr id="58" name="TextBox 57"/>
@@ -31975,11 +32414,18 @@
                     </m:oMathParaPr>
                     <m:oMath xmlns:m="http://schemas.openxmlformats.org/officeDocument/2006/math">
                       <m:r>
-                        <a:rPr lang="en-US" sz="2400" i="1">
+                        <a:rPr lang="en-US" sz="2400" b="0" i="1" smtClean="0">
                           <a:latin typeface="Cambria Math" panose="02040503050406030204" pitchFamily="18" charset="0"/>
                           <a:ea typeface="Cambria Math" panose="02040503050406030204" pitchFamily="18" charset="0"/>
                         </a:rPr>
-                        <m:t>1.</m:t>
+                        <m:t>𝑎</m:t>
+                      </m:r>
+                      <m:r>
+                        <a:rPr lang="en-US" sz="2400" b="0" i="1" smtClean="0">
+                          <a:latin typeface="Cambria Math" panose="02040503050406030204" pitchFamily="18" charset="0"/>
+                          <a:ea typeface="Cambria Math" panose="02040503050406030204" pitchFamily="18" charset="0"/>
+                        </a:rPr>
+                        <m:t>)</m:t>
                       </m:r>
                     </m:oMath>
                   </m:oMathPara>
@@ -31992,7 +32438,7 @@
             </p:txBody>
           </p:sp>
         </mc:Choice>
-        <mc:Fallback xmlns="">
+        <mc:Fallback>
           <p:sp>
             <p:nvSpPr>
               <p:cNvPr id="58" name="TextBox 57"/>
@@ -32012,7 +32458,7 @@
               <a:blipFill>
                 <a:blip r:embed="rId14"/>
                 <a:stretch>
-                  <a:fillRect l="-38095" r="-11905" b="-10000"/>
+                  <a:fillRect l="-30952" r="-73810" b="-38333"/>
                 </a:stretch>
               </a:blipFill>
             </p:spPr>
@@ -32031,8 +32477,8 @@
           </p:sp>
         </mc:Fallback>
       </mc:AlternateContent>
-      <mc:AlternateContent xmlns:mc="http://schemas.openxmlformats.org/markup-compatibility/2006" xmlns:a14="http://schemas.microsoft.com/office/drawing/2010/main">
-        <mc:Choice Requires="a14">
+      <mc:AlternateContent xmlns:mc="http://schemas.openxmlformats.org/markup-compatibility/2006">
+        <mc:Choice xmlns:a14="http://schemas.microsoft.com/office/drawing/2010/main" Requires="a14">
           <p:sp>
             <p:nvSpPr>
               <p:cNvPr id="59" name="TextBox 58"/>
@@ -32065,11 +32511,18 @@
                     </m:oMathParaPr>
                     <m:oMath xmlns:m="http://schemas.openxmlformats.org/officeDocument/2006/math">
                       <m:r>
-                        <a:rPr lang="en-US" sz="2400" i="1">
+                        <a:rPr lang="en-US" sz="2400" b="0" i="1" smtClean="0">
                           <a:latin typeface="Cambria Math" panose="02040503050406030204" pitchFamily="18" charset="0"/>
                           <a:ea typeface="Cambria Math" panose="02040503050406030204" pitchFamily="18" charset="0"/>
                         </a:rPr>
-                        <m:t>2.</m:t>
+                        <m:t>𝑏</m:t>
+                      </m:r>
+                      <m:r>
+                        <a:rPr lang="en-US" sz="2400" b="0" i="1" smtClean="0">
+                          <a:latin typeface="Cambria Math" panose="02040503050406030204" pitchFamily="18" charset="0"/>
+                          <a:ea typeface="Cambria Math" panose="02040503050406030204" pitchFamily="18" charset="0"/>
+                        </a:rPr>
+                        <m:t>)</m:t>
                       </m:r>
                     </m:oMath>
                   </m:oMathPara>
@@ -32082,7 +32535,7 @@
             </p:txBody>
           </p:sp>
         </mc:Choice>
-        <mc:Fallback xmlns="">
+        <mc:Fallback>
           <p:sp>
             <p:nvSpPr>
               <p:cNvPr id="59" name="TextBox 58"/>
@@ -32102,7 +32555,7 @@
               <a:blipFill>
                 <a:blip r:embed="rId15"/>
                 <a:stretch>
-                  <a:fillRect l="-39024" r="-14634" b="-9836"/>
+                  <a:fillRect l="-43902" r="-75610" b="-37705"/>
                 </a:stretch>
               </a:blipFill>
             </p:spPr>
@@ -32121,8 +32574,8 @@
           </p:sp>
         </mc:Fallback>
       </mc:AlternateContent>
-      <mc:AlternateContent xmlns:mc="http://schemas.openxmlformats.org/markup-compatibility/2006" xmlns:a14="http://schemas.microsoft.com/office/drawing/2010/main">
-        <mc:Choice Requires="a14">
+      <mc:AlternateContent xmlns:mc="http://schemas.openxmlformats.org/markup-compatibility/2006">
+        <mc:Choice xmlns:a14="http://schemas.microsoft.com/office/drawing/2010/main" Requires="a14">
           <p:sp>
             <p:nvSpPr>
               <p:cNvPr id="60" name="TextBox 59"/>
@@ -32132,7 +32585,7 @@
             <p:spPr>
               <a:xfrm>
                 <a:off x="8875472" y="2662111"/>
-                <a:ext cx="299762" cy="369332"/>
+                <a:ext cx="346377" cy="369332"/>
               </a:xfrm>
               <a:prstGeom prst="rect">
                 <a:avLst/>
@@ -32153,11 +32606,18 @@
                     </m:oMathParaPr>
                     <m:oMath xmlns:m="http://schemas.openxmlformats.org/officeDocument/2006/math">
                       <m:r>
-                        <a:rPr lang="en-US" sz="2400" i="1">
+                        <a:rPr lang="en-US" sz="2400" b="0" i="1" smtClean="0">
                           <a:latin typeface="Cambria Math" panose="02040503050406030204" pitchFamily="18" charset="0"/>
                           <a:ea typeface="Cambria Math" panose="02040503050406030204" pitchFamily="18" charset="0"/>
                         </a:rPr>
-                        <m:t>3.</m:t>
+                        <m:t>𝑐</m:t>
+                      </m:r>
+                      <m:r>
+                        <a:rPr lang="en-US" sz="2400" b="0" i="1" smtClean="0">
+                          <a:latin typeface="Cambria Math" panose="02040503050406030204" pitchFamily="18" charset="0"/>
+                          <a:ea typeface="Cambria Math" panose="02040503050406030204" pitchFamily="18" charset="0"/>
+                        </a:rPr>
+                        <m:t>)</m:t>
                       </m:r>
                     </m:oMath>
                   </m:oMathPara>
@@ -32170,7 +32630,7 @@
             </p:txBody>
           </p:sp>
         </mc:Choice>
-        <mc:Fallback xmlns="">
+        <mc:Fallback>
           <p:sp>
             <p:nvSpPr>
               <p:cNvPr id="60" name="TextBox 59"/>
@@ -32182,7 +32642,7 @@
             <p:spPr>
               <a:xfrm>
                 <a:off x="8875472" y="2662111"/>
-                <a:ext cx="299762" cy="369332"/>
+                <a:ext cx="346377" cy="369332"/>
               </a:xfrm>
               <a:prstGeom prst="rect">
                 <a:avLst/>
@@ -32190,7 +32650,7 @@
               <a:blipFill>
                 <a:blip r:embed="rId16"/>
                 <a:stretch>
-                  <a:fillRect l="-24490" r="-4082" b="-10000"/>
+                  <a:fillRect l="-12281" r="-29825" b="-38333"/>
                 </a:stretch>
               </a:blipFill>
             </p:spPr>
@@ -32830,9 +33290,9 @@
           <p:nvPr/>
         </p:nvSpPr>
         <p:spPr>
-          <a:xfrm rot="2169423">
-            <a:off x="8734371" y="4450691"/>
-            <a:ext cx="1551966" cy="101532"/>
+          <a:xfrm rot="1241890">
+            <a:off x="8863722" y="4614806"/>
+            <a:ext cx="1241992" cy="126208"/>
           </a:xfrm>
           <a:custGeom>
             <a:avLst/>
@@ -34443,8 +34903,8 @@
           </a:prstGeom>
         </p:spPr>
       </p:pic>
-      <mc:AlternateContent xmlns:mc="http://schemas.openxmlformats.org/markup-compatibility/2006" xmlns:a14="http://schemas.microsoft.com/office/drawing/2010/main">
-        <mc:Choice Requires="a14">
+      <mc:AlternateContent xmlns:mc="http://schemas.openxmlformats.org/markup-compatibility/2006">
+        <mc:Choice xmlns:a14="http://schemas.microsoft.com/office/drawing/2010/main" Requires="a14">
           <p:sp>
             <p:nvSpPr>
               <p:cNvPr id="33" name="TextBox 32"/>
@@ -34454,7 +34914,7 @@
             <p:spPr>
               <a:xfrm>
                 <a:off x="264247" y="2940861"/>
-                <a:ext cx="368691" cy="369332"/>
+                <a:ext cx="443519" cy="369332"/>
               </a:xfrm>
               <a:prstGeom prst="rect">
                 <a:avLst/>
@@ -34481,10 +34941,16 @@
                         <m:t> </m:t>
                       </m:r>
                       <m:r>
-                        <a:rPr lang="en-US" sz="2400" i="1">
+                        <a:rPr lang="en-US" sz="2400" b="0" i="1" smtClean="0">
                           <a:latin typeface="Cambria Math" panose="02040503050406030204" pitchFamily="18" charset="0"/>
                         </a:rPr>
-                        <m:t>1.</m:t>
+                        <m:t>𝑎</m:t>
+                      </m:r>
+                      <m:r>
+                        <a:rPr lang="en-US" sz="2400" b="0" i="1" smtClean="0">
+                          <a:latin typeface="Cambria Math" panose="02040503050406030204" pitchFamily="18" charset="0"/>
+                        </a:rPr>
+                        <m:t>)</m:t>
                       </m:r>
                     </m:oMath>
                   </m:oMathPara>
@@ -34494,7 +34960,7 @@
             </p:txBody>
           </p:sp>
         </mc:Choice>
-        <mc:Fallback xmlns="">
+        <mc:Fallback>
           <p:sp>
             <p:nvSpPr>
               <p:cNvPr id="33" name="TextBox 32"/>
@@ -34506,7 +34972,7 @@
             <p:spPr>
               <a:xfrm>
                 <a:off x="264247" y="2940861"/>
-                <a:ext cx="368691" cy="369332"/>
+                <a:ext cx="443519" cy="369332"/>
               </a:xfrm>
               <a:prstGeom prst="rect">
                 <a:avLst/>
@@ -34514,7 +34980,7 @@
               <a:blipFill>
                 <a:blip r:embed="rId7"/>
                 <a:stretch>
-                  <a:fillRect r="-3279" b="-6557"/>
+                  <a:fillRect r="-24658" b="-34426"/>
                 </a:stretch>
               </a:blipFill>
             </p:spPr>
@@ -34533,8 +34999,8 @@
           </p:sp>
         </mc:Fallback>
       </mc:AlternateContent>
-      <mc:AlternateContent xmlns:mc="http://schemas.openxmlformats.org/markup-compatibility/2006" xmlns:a14="http://schemas.microsoft.com/office/drawing/2010/main">
-        <mc:Choice Requires="a14">
+      <mc:AlternateContent xmlns:mc="http://schemas.openxmlformats.org/markup-compatibility/2006">
+        <mc:Choice xmlns:a14="http://schemas.microsoft.com/office/drawing/2010/main" Requires="a14">
           <p:sp>
             <p:nvSpPr>
               <p:cNvPr id="34" name="TextBox 33"/>
@@ -34544,7 +35010,7 @@
             <p:spPr>
               <a:xfrm>
                 <a:off x="4541924" y="2967828"/>
-                <a:ext cx="368691" cy="369332"/>
+                <a:ext cx="437940" cy="369332"/>
               </a:xfrm>
               <a:prstGeom prst="rect">
                 <a:avLst/>
@@ -34571,10 +35037,16 @@
                         <m:t> </m:t>
                       </m:r>
                       <m:r>
-                        <a:rPr lang="en-US" sz="2400" i="1">
+                        <a:rPr lang="en-US" sz="2400" b="0" i="1" smtClean="0">
                           <a:latin typeface="Cambria Math" panose="02040503050406030204" pitchFamily="18" charset="0"/>
                         </a:rPr>
-                        <m:t>2.</m:t>
+                        <m:t>𝑏</m:t>
+                      </m:r>
+                      <m:r>
+                        <a:rPr lang="en-US" sz="2400" b="0" i="1" smtClean="0">
+                          <a:latin typeface="Cambria Math" panose="02040503050406030204" pitchFamily="18" charset="0"/>
+                        </a:rPr>
+                        <m:t>)</m:t>
                       </m:r>
                     </m:oMath>
                   </m:oMathPara>
@@ -34584,7 +35056,7 @@
             </p:txBody>
           </p:sp>
         </mc:Choice>
-        <mc:Fallback xmlns="">
+        <mc:Fallback>
           <p:sp>
             <p:nvSpPr>
               <p:cNvPr id="34" name="TextBox 33"/>
@@ -34596,7 +35068,7 @@
             <p:spPr>
               <a:xfrm>
                 <a:off x="4541924" y="2967828"/>
-                <a:ext cx="368691" cy="369332"/>
+                <a:ext cx="437940" cy="369332"/>
               </a:xfrm>
               <a:prstGeom prst="rect">
                 <a:avLst/>
@@ -34604,7 +35076,7 @@
               <a:blipFill>
                 <a:blip r:embed="rId8"/>
                 <a:stretch>
-                  <a:fillRect r="-3279" b="-6667"/>
+                  <a:fillRect l="-1389" r="-25000" b="-35000"/>
                 </a:stretch>
               </a:blipFill>
             </p:spPr>
@@ -34623,8 +35095,8 @@
           </p:sp>
         </mc:Fallback>
       </mc:AlternateContent>
-      <mc:AlternateContent xmlns:mc="http://schemas.openxmlformats.org/markup-compatibility/2006" xmlns:a14="http://schemas.microsoft.com/office/drawing/2010/main">
-        <mc:Choice Requires="a14">
+      <mc:AlternateContent xmlns:mc="http://schemas.openxmlformats.org/markup-compatibility/2006">
+        <mc:Choice xmlns:a14="http://schemas.microsoft.com/office/drawing/2010/main" Requires="a14">
           <p:sp>
             <p:nvSpPr>
               <p:cNvPr id="35" name="TextBox 34"/>
@@ -34634,7 +35106,7 @@
             <p:spPr>
               <a:xfrm>
                 <a:off x="8815450" y="2967828"/>
-                <a:ext cx="301365" cy="369332"/>
+                <a:ext cx="347980" cy="369332"/>
               </a:xfrm>
               <a:prstGeom prst="rect">
                 <a:avLst/>
@@ -34655,10 +35127,16 @@
                     </m:oMathParaPr>
                     <m:oMath xmlns:m="http://schemas.openxmlformats.org/officeDocument/2006/math">
                       <m:r>
-                        <a:rPr lang="en-US" sz="2400" i="1">
+                        <a:rPr lang="en-US" sz="2400" b="0" i="1" smtClean="0">
                           <a:latin typeface="Cambria Math" panose="02040503050406030204" pitchFamily="18" charset="0"/>
                         </a:rPr>
-                        <m:t>3.</m:t>
+                        <m:t>𝑐</m:t>
+                      </m:r>
+                      <m:r>
+                        <a:rPr lang="en-US" sz="2400" b="0" i="1" smtClean="0">
+                          <a:latin typeface="Cambria Math" panose="02040503050406030204" pitchFamily="18" charset="0"/>
+                        </a:rPr>
+                        <m:t>)</m:t>
                       </m:r>
                     </m:oMath>
                   </m:oMathPara>
@@ -34668,7 +35146,7 @@
             </p:txBody>
           </p:sp>
         </mc:Choice>
-        <mc:Fallback xmlns="">
+        <mc:Fallback>
           <p:sp>
             <p:nvSpPr>
               <p:cNvPr id="35" name="TextBox 34"/>
@@ -34680,7 +35158,7 @@
             <p:spPr>
               <a:xfrm>
                 <a:off x="8815450" y="2967828"/>
-                <a:ext cx="301365" cy="369332"/>
+                <a:ext cx="347980" cy="369332"/>
               </a:xfrm>
               <a:prstGeom prst="rect">
                 <a:avLst/>
@@ -34688,7 +35166,7 @@
               <a:blipFill>
                 <a:blip r:embed="rId9"/>
                 <a:stretch>
-                  <a:fillRect l="-22000" r="-4000" b="-6667"/>
+                  <a:fillRect l="-10526" r="-31579" b="-35000"/>
                 </a:stretch>
               </a:blipFill>
             </p:spPr>
@@ -35082,6 +35560,139 @@
                 <a:blip r:embed="rId12"/>
                 <a:stretch>
                   <a:fillRect l="-7576" r="-12121" b="-29091"/>
+                </a:stretch>
+              </a:blipFill>
+            </p:spPr>
+            <p:txBody>
+              <a:bodyPr/>
+              <a:lstStyle/>
+              <a:p>
+                <a:r>
+                  <a:rPr lang="ru-RU">
+                    <a:noFill/>
+                  </a:rPr>
+                  <a:t> </a:t>
+                </a:r>
+              </a:p>
+            </p:txBody>
+          </p:sp>
+        </mc:Fallback>
+      </mc:AlternateContent>
+      <p:sp>
+        <p:nvSpPr>
+          <p:cNvPr id="3" name="Дуга 2"/>
+          <p:cNvSpPr/>
+          <p:nvPr/>
+        </p:nvSpPr>
+        <p:spPr>
+          <a:xfrm>
+            <a:off x="9207468" y="3582949"/>
+            <a:ext cx="2880000" cy="2880000"/>
+          </a:xfrm>
+          <a:prstGeom prst="arc">
+            <a:avLst>
+              <a:gd name="adj1" fmla="val 12167480"/>
+              <a:gd name="adj2" fmla="val 11475269"/>
+            </a:avLst>
+          </a:prstGeom>
+          <a:ln w="31750">
+            <a:solidFill>
+              <a:srgbClr val="FF0000"/>
+            </a:solidFill>
+            <a:headEnd type="stealth" w="lg" len="lg"/>
+            <a:tailEnd type="none" w="lg" len="lg"/>
+          </a:ln>
+        </p:spPr>
+        <p:style>
+          <a:lnRef idx="1">
+            <a:schemeClr val="accent1"/>
+          </a:lnRef>
+          <a:fillRef idx="0">
+            <a:schemeClr val="accent1"/>
+          </a:fillRef>
+          <a:effectRef idx="0">
+            <a:schemeClr val="accent1"/>
+          </a:effectRef>
+          <a:fontRef idx="minor">
+            <a:schemeClr val="tx1"/>
+          </a:fontRef>
+        </p:style>
+        <p:txBody>
+          <a:bodyPr rtlCol="0" anchor="ctr"/>
+          <a:lstStyle/>
+          <a:p>
+            <a:pPr algn="ctr"/>
+            <a:endParaRPr lang="ru-RU"/>
+          </a:p>
+        </p:txBody>
+      </p:sp>
+      <mc:AlternateContent xmlns:mc="http://schemas.openxmlformats.org/markup-compatibility/2006">
+        <mc:Choice xmlns:a14="http://schemas.microsoft.com/office/drawing/2010/main" Requires="a14">
+          <p:sp>
+            <p:nvSpPr>
+              <p:cNvPr id="32" name="TextBox 31"/>
+              <p:cNvSpPr txBox="1"/>
+              <p:nvPr/>
+            </p:nvSpPr>
+            <p:spPr>
+              <a:xfrm>
+                <a:off x="12009801" y="4268274"/>
+                <a:ext cx="343571" cy="369332"/>
+              </a:xfrm>
+              <a:prstGeom prst="rect">
+                <a:avLst/>
+              </a:prstGeom>
+              <a:noFill/>
+            </p:spPr>
+            <p:txBody>
+              <a:bodyPr wrap="square" lIns="0" tIns="0" rIns="0" bIns="0" rtlCol="0">
+                <a:spAutoFit/>
+              </a:bodyPr>
+              <a:lstStyle/>
+              <a:p>
+                <a:pPr/>
+                <a14:m>
+                  <m:oMathPara xmlns:m="http://schemas.openxmlformats.org/officeDocument/2006/math">
+                    <m:oMathParaPr>
+                      <m:jc m:val="centerGroup"/>
+                    </m:oMathParaPr>
+                    <m:oMath xmlns:m="http://schemas.openxmlformats.org/officeDocument/2006/math">
+                      <m:r>
+                        <a:rPr lang="ru-RU" sz="2400" i="1" smtClean="0">
+                          <a:latin typeface="Cambria Math" panose="02040503050406030204" pitchFamily="18" charset="0"/>
+                          <a:ea typeface="Cambria Math" panose="02040503050406030204" pitchFamily="18" charset="0"/>
+                        </a:rPr>
+                        <m:t>𝛾</m:t>
+                      </m:r>
+                    </m:oMath>
+                  </m:oMathPara>
+                </a14:m>
+                <a:endParaRPr lang="ru-RU" sz="2400" dirty="0"/>
+              </a:p>
+            </p:txBody>
+          </p:sp>
+        </mc:Choice>
+        <mc:Fallback>
+          <p:sp>
+            <p:nvSpPr>
+              <p:cNvPr id="32" name="TextBox 31"/>
+              <p:cNvSpPr txBox="1">
+                <a:spLocks noRot="1" noChangeAspect="1" noMove="1" noResize="1" noEditPoints="1" noAdjustHandles="1" noChangeArrowheads="1" noChangeShapeType="1" noTextEdit="1"/>
+              </p:cNvSpPr>
+              <p:nvPr/>
+            </p:nvSpPr>
+            <p:spPr>
+              <a:xfrm>
+                <a:off x="12009801" y="4268274"/>
+                <a:ext cx="343571" cy="369332"/>
+              </a:xfrm>
+              <a:prstGeom prst="rect">
+                <a:avLst/>
+              </a:prstGeom>
+              <a:blipFill>
+                <a:blip r:embed="rId13"/>
+                <a:stretch>
+                  <a:fillRect l="-5357" r="-3571" b="-22951"/>
                 </a:stretch>
               </a:blipFill>
             </p:spPr>

</xml_diff>